<commit_message>
Update app.py with consolidated spinner and improved UI; Remove special query slide from template
</commit_message>
<xml_diff>
--- a/template.pptx
+++ b/template.pptx
@@ -5,7 +5,7 @@
     <p:sldMasterId id="2147483672" r:id="rId1"/>
   </p:sldMasterIdLst>
   <p:notesMasterIdLst>
-    <p:notesMasterId r:id="rId11"/>
+    <p:notesMasterId r:id="rId10"/>
   </p:notesMasterIdLst>
   <p:sldIdLst>
     <p:sldId id="257" r:id="rId2"/>
@@ -16,7 +16,6 @@
     <p:sldId id="316" r:id="rId7"/>
     <p:sldId id="318" r:id="rId8"/>
     <p:sldId id="319" r:id="rId9"/>
-    <p:sldId id="308" r:id="rId10"/>
   </p:sldIdLst>
   <p:sldSz cx="12192000" cy="6858000"/>
   <p:notesSz cx="6858000" cy="9144000"/>
@@ -205,7 +204,7 @@
           <a:p>
             <a:fld id="{61ABDEB7-EF38-F14D-99E5-63E0A91EABAF}" type="datetimeFigureOut">
               <a:rPr lang="en-US" smtClean="0"/>
-              <a:t>5/7/25</a:t>
+              <a:t>5/8/25</a:t>
             </a:fld>
             <a:endParaRPr lang="en-US"/>
           </a:p>
@@ -1120,114 +1119,6 @@
 </p:notes>
 </file>
 
-<file path=ppt/notesSlides/notesSlide7.xml><?xml version="1.0" encoding="utf-8"?>
-<p:notes xmlns:a="http://schemas.openxmlformats.org/drawingml/2006/main" xmlns:r="http://schemas.openxmlformats.org/officeDocument/2006/relationships" xmlns:p="http://schemas.openxmlformats.org/presentationml/2006/main">
-  <p:cSld>
-    <p:spTree>
-      <p:nvGrpSpPr>
-        <p:cNvPr id="1" name="">
-          <a:extLst>
-            <a:ext uri="{FF2B5EF4-FFF2-40B4-BE49-F238E27FC236}">
-              <a16:creationId xmlns:a16="http://schemas.microsoft.com/office/drawing/2014/main" id="{8D237AFE-F149-CEA0-C00E-3F87E71738EF}"/>
-            </a:ext>
-          </a:extLst>
-        </p:cNvPr>
-        <p:cNvGrpSpPr/>
-        <p:nvPr/>
-      </p:nvGrpSpPr>
-      <p:grpSpPr>
-        <a:xfrm>
-          <a:off x="0" y="0"/>
-          <a:ext cx="0" cy="0"/>
-          <a:chOff x="0" y="0"/>
-          <a:chExt cx="0" cy="0"/>
-        </a:xfrm>
-      </p:grpSpPr>
-      <p:sp>
-        <p:nvSpPr>
-          <p:cNvPr id="2" name="Slide Image Placeholder 1">
-            <a:extLst>
-              <a:ext uri="{FF2B5EF4-FFF2-40B4-BE49-F238E27FC236}">
-                <a16:creationId xmlns:a16="http://schemas.microsoft.com/office/drawing/2014/main" id="{BCFA77DB-5221-62F6-CA4C-452452D3F529}"/>
-              </a:ext>
-            </a:extLst>
-          </p:cNvPr>
-          <p:cNvSpPr>
-            <a:spLocks noGrp="1" noRot="1" noChangeAspect="1"/>
-          </p:cNvSpPr>
-          <p:nvPr>
-            <p:ph type="sldImg"/>
-          </p:nvPr>
-        </p:nvSpPr>
-        <p:spPr/>
-      </p:sp>
-      <p:sp>
-        <p:nvSpPr>
-          <p:cNvPr id="3" name="Notes Placeholder 2">
-            <a:extLst>
-              <a:ext uri="{FF2B5EF4-FFF2-40B4-BE49-F238E27FC236}">
-                <a16:creationId xmlns:a16="http://schemas.microsoft.com/office/drawing/2014/main" id="{033D6B24-9E1C-8C43-8009-4AC770F3E7B9}"/>
-              </a:ext>
-            </a:extLst>
-          </p:cNvPr>
-          <p:cNvSpPr>
-            <a:spLocks noGrp="1"/>
-          </p:cNvSpPr>
-          <p:nvPr>
-            <p:ph type="body" idx="1"/>
-          </p:nvPr>
-        </p:nvSpPr>
-        <p:spPr/>
-        <p:txBody>
-          <a:bodyPr/>
-          <a:lstStyle/>
-          <a:p>
-            <a:endParaRPr lang="en-US" dirty="0"/>
-          </a:p>
-        </p:txBody>
-      </p:sp>
-      <p:sp>
-        <p:nvSpPr>
-          <p:cNvPr id="4" name="Slide Number Placeholder 3">
-            <a:extLst>
-              <a:ext uri="{FF2B5EF4-FFF2-40B4-BE49-F238E27FC236}">
-                <a16:creationId xmlns:a16="http://schemas.microsoft.com/office/drawing/2014/main" id="{6DDD4235-8142-9DF3-EAEC-A2DDF6774C4A}"/>
-              </a:ext>
-            </a:extLst>
-          </p:cNvPr>
-          <p:cNvSpPr>
-            <a:spLocks noGrp="1"/>
-          </p:cNvSpPr>
-          <p:nvPr>
-            <p:ph type="sldNum" sz="quarter" idx="5"/>
-          </p:nvPr>
-        </p:nvSpPr>
-        <p:spPr/>
-        <p:txBody>
-          <a:bodyPr/>
-          <a:lstStyle/>
-          <a:p>
-            <a:fld id="{32E8A003-2411-6846-AED7-B6BF4ECAC239}" type="slidenum">
-              <a:rPr lang="en-US" smtClean="0"/>
-              <a:t>9</a:t>
-            </a:fld>
-            <a:endParaRPr lang="en-US"/>
-          </a:p>
-        </p:txBody>
-      </p:sp>
-    </p:spTree>
-    <p:extLst>
-      <p:ext uri="{BB962C8B-B14F-4D97-AF65-F5344CB8AC3E}">
-        <p14:creationId xmlns:p14="http://schemas.microsoft.com/office/powerpoint/2010/main" val="3916280707"/>
-      </p:ext>
-    </p:extLst>
-  </p:cSld>
-  <p:clrMapOvr>
-    <a:masterClrMapping/>
-  </p:clrMapOvr>
-</p:notes>
-</file>
-
 <file path=ppt/slideLayouts/slideLayout1.xml><?xml version="1.0" encoding="utf-8"?>
 <p:sldLayout xmlns:a="http://schemas.openxmlformats.org/drawingml/2006/main" xmlns:r="http://schemas.openxmlformats.org/officeDocument/2006/relationships" xmlns:p="http://schemas.openxmlformats.org/presentationml/2006/main" type="blank" preserve="1">
   <p:cSld name="Blank">
@@ -1269,7 +1160,7 @@
             <a:fld id="{1D8BD707-D9CF-40AE-B4C6-C98DA3205C09}" type="datetimeFigureOut">
               <a:rPr lang="en-US" smtClean="0"/>
               <a:pPr/>
-              <a:t>5/7/25</a:t>
+              <a:t>5/8/25</a:t>
             </a:fld>
             <a:endParaRPr lang="en-US"/>
           </a:p>
@@ -1612,7 +1503,7 @@
             <a:fld id="{1D8BD707-D9CF-40AE-B4C6-C98DA3205C09}" type="datetimeFigureOut">
               <a:rPr lang="en-US" smtClean="0"/>
               <a:pPr/>
-              <a:t>5/7/25</a:t>
+              <a:t>5/8/25</a:t>
             </a:fld>
             <a:endParaRPr lang="en-US"/>
           </a:p>
@@ -2083,7 +1974,7 @@
             <a:fld id="{1D8BD707-D9CF-40AE-B4C6-C98DA3205C09}" type="datetimeFigureOut">
               <a:rPr lang="en-US" smtClean="0"/>
               <a:pPr/>
-              <a:t>5/7/25</a:t>
+              <a:t>5/8/25</a:t>
             </a:fld>
             <a:endParaRPr lang="en-US"/>
           </a:p>
@@ -5123,317 +5014,6 @@
     <p:extLst>
       <p:ext uri="{BB962C8B-B14F-4D97-AF65-F5344CB8AC3E}">
         <p14:creationId xmlns:p14="http://schemas.microsoft.com/office/powerpoint/2010/main" val="2015886552"/>
-      </p:ext>
-    </p:extLst>
-  </p:cSld>
-  <p:clrMapOvr>
-    <a:masterClrMapping/>
-  </p:clrMapOvr>
-  <p:transition spd="slow">
-    <p:fade/>
-  </p:transition>
-</p:sld>
-</file>
-
-<file path=ppt/slides/slide9.xml><?xml version="1.0" encoding="utf-8"?>
-<p:sld xmlns:a="http://schemas.openxmlformats.org/drawingml/2006/main" xmlns:r="http://schemas.openxmlformats.org/officeDocument/2006/relationships" xmlns:p="http://schemas.openxmlformats.org/presentationml/2006/main">
-  <p:cSld>
-    <p:spTree>
-      <p:nvGrpSpPr>
-        <p:cNvPr id="1" name="">
-          <a:extLst>
-            <a:ext uri="{FF2B5EF4-FFF2-40B4-BE49-F238E27FC236}">
-              <a16:creationId xmlns:a16="http://schemas.microsoft.com/office/drawing/2014/main" id="{437131B9-C556-5683-75F5-49E6FCE84868}"/>
-            </a:ext>
-          </a:extLst>
-        </p:cNvPr>
-        <p:cNvGrpSpPr/>
-        <p:nvPr/>
-      </p:nvGrpSpPr>
-      <p:grpSpPr>
-        <a:xfrm>
-          <a:off x="0" y="0"/>
-          <a:ext cx="0" cy="0"/>
-          <a:chOff x="0" y="0"/>
-          <a:chExt cx="0" cy="0"/>
-        </a:xfrm>
-      </p:grpSpPr>
-      <p:grpSp>
-        <p:nvGrpSpPr>
-          <p:cNvPr id="3" name="Group 3">
-            <a:extLst>
-              <a:ext uri="{FF2B5EF4-FFF2-40B4-BE49-F238E27FC236}">
-                <a16:creationId xmlns:a16="http://schemas.microsoft.com/office/drawing/2014/main" id="{C27D40A6-86B8-EEDE-C944-BC95935B867E}"/>
-              </a:ext>
-            </a:extLst>
-          </p:cNvPr>
-          <p:cNvGrpSpPr/>
-          <p:nvPr/>
-        </p:nvGrpSpPr>
-        <p:grpSpPr>
-          <a:xfrm>
-            <a:off x="11894580" y="5257737"/>
-            <a:ext cx="297421" cy="1600263"/>
-            <a:chOff x="0" y="0"/>
-            <a:chExt cx="117500" cy="632202"/>
-          </a:xfrm>
-        </p:grpSpPr>
-        <p:sp>
-          <p:nvSpPr>
-            <p:cNvPr id="4" name="Freeform 4">
-              <a:extLst>
-                <a:ext uri="{FF2B5EF4-FFF2-40B4-BE49-F238E27FC236}">
-                  <a16:creationId xmlns:a16="http://schemas.microsoft.com/office/drawing/2014/main" id="{9F64EB9D-5D98-DABE-2175-EF123C58CBC5}"/>
-                </a:ext>
-              </a:extLst>
-            </p:cNvPr>
-            <p:cNvSpPr/>
-            <p:nvPr/>
-          </p:nvSpPr>
-          <p:spPr>
-            <a:xfrm>
-              <a:off x="0" y="0"/>
-              <a:ext cx="117500" cy="632202"/>
-            </a:xfrm>
-            <a:custGeom>
-              <a:avLst/>
-              <a:gdLst/>
-              <a:ahLst/>
-              <a:cxnLst/>
-              <a:rect l="l" t="t" r="r" b="b"/>
-              <a:pathLst>
-                <a:path w="117500" h="632202">
-                  <a:moveTo>
-                    <a:pt x="0" y="0"/>
-                  </a:moveTo>
-                  <a:lnTo>
-                    <a:pt x="117500" y="0"/>
-                  </a:lnTo>
-                  <a:lnTo>
-                    <a:pt x="117500" y="632202"/>
-                  </a:lnTo>
-                  <a:lnTo>
-                    <a:pt x="0" y="632202"/>
-                  </a:lnTo>
-                  <a:close/>
-                </a:path>
-              </a:pathLst>
-            </a:custGeom>
-            <a:solidFill>
-              <a:srgbClr val="FFBE00"/>
-            </a:solidFill>
-          </p:spPr>
-          <p:txBody>
-            <a:bodyPr/>
-            <a:lstStyle/>
-            <a:p>
-              <a:endParaRPr lang="en-US" sz="1200"/>
-            </a:p>
-          </p:txBody>
-        </p:sp>
-        <p:sp>
-          <p:nvSpPr>
-            <p:cNvPr id="5" name="TextBox 5">
-              <a:extLst>
-                <a:ext uri="{FF2B5EF4-FFF2-40B4-BE49-F238E27FC236}">
-                  <a16:creationId xmlns:a16="http://schemas.microsoft.com/office/drawing/2014/main" id="{4547445B-C6DA-0842-E41A-805E58AB6AF7}"/>
-                </a:ext>
-              </a:extLst>
-            </p:cNvPr>
-            <p:cNvSpPr txBox="1"/>
-            <p:nvPr/>
-          </p:nvSpPr>
-          <p:spPr>
-            <a:xfrm>
-              <a:off x="0" y="-57150"/>
-              <a:ext cx="117500" cy="689352"/>
-            </a:xfrm>
-            <a:prstGeom prst="rect">
-              <a:avLst/>
-            </a:prstGeom>
-          </p:spPr>
-          <p:txBody>
-            <a:bodyPr lIns="33867" tIns="33867" rIns="33867" bIns="33867" rtlCol="0" anchor="ctr"/>
-            <a:lstStyle/>
-            <a:p>
-              <a:pPr algn="ctr">
-                <a:lnSpc>
-                  <a:spcPts val="1847"/>
-                </a:lnSpc>
-              </a:pPr>
-              <a:endParaRPr sz="1200"/>
-            </a:p>
-          </p:txBody>
-        </p:sp>
-      </p:grpSp>
-      <p:grpSp>
-        <p:nvGrpSpPr>
-          <p:cNvPr id="6" name="Group 6">
-            <a:extLst>
-              <a:ext uri="{FF2B5EF4-FFF2-40B4-BE49-F238E27FC236}">
-                <a16:creationId xmlns:a16="http://schemas.microsoft.com/office/drawing/2014/main" id="{0E326AFE-3DE6-B041-6987-FD80129DC1DD}"/>
-              </a:ext>
-            </a:extLst>
-          </p:cNvPr>
-          <p:cNvGrpSpPr/>
-          <p:nvPr/>
-        </p:nvGrpSpPr>
-        <p:grpSpPr>
-          <a:xfrm>
-            <a:off x="0" y="-144660"/>
-            <a:ext cx="12192000" cy="2407773"/>
-            <a:chOff x="0" y="-57150"/>
-            <a:chExt cx="4816593" cy="951219"/>
-          </a:xfrm>
-        </p:grpSpPr>
-        <p:sp>
-          <p:nvSpPr>
-            <p:cNvPr id="7" name="Freeform 7">
-              <a:extLst>
-                <a:ext uri="{FF2B5EF4-FFF2-40B4-BE49-F238E27FC236}">
-                  <a16:creationId xmlns:a16="http://schemas.microsoft.com/office/drawing/2014/main" id="{6A187367-63D7-331F-03FE-67D0BDDC19DA}"/>
-                </a:ext>
-              </a:extLst>
-            </p:cNvPr>
-            <p:cNvSpPr/>
-            <p:nvPr/>
-          </p:nvSpPr>
-          <p:spPr>
-            <a:xfrm>
-              <a:off x="0" y="0"/>
-              <a:ext cx="4816592" cy="411417"/>
-            </a:xfrm>
-            <a:custGeom>
-              <a:avLst/>
-              <a:gdLst/>
-              <a:ahLst/>
-              <a:cxnLst/>
-              <a:rect l="l" t="t" r="r" b="b"/>
-              <a:pathLst>
-                <a:path w="4816592" h="894069">
-                  <a:moveTo>
-                    <a:pt x="0" y="0"/>
-                  </a:moveTo>
-                  <a:lnTo>
-                    <a:pt x="4816592" y="0"/>
-                  </a:lnTo>
-                  <a:lnTo>
-                    <a:pt x="4816592" y="894069"/>
-                  </a:lnTo>
-                  <a:lnTo>
-                    <a:pt x="0" y="894069"/>
-                  </a:lnTo>
-                  <a:close/>
-                </a:path>
-              </a:pathLst>
-            </a:custGeom>
-            <a:solidFill>
-              <a:srgbClr val="073062"/>
-            </a:solidFill>
-          </p:spPr>
-          <p:txBody>
-            <a:bodyPr/>
-            <a:lstStyle/>
-            <a:p>
-              <a:endParaRPr lang="en-US" sz="1200"/>
-            </a:p>
-          </p:txBody>
-        </p:sp>
-        <p:sp>
-          <p:nvSpPr>
-            <p:cNvPr id="8" name="TextBox 8">
-              <a:extLst>
-                <a:ext uri="{FF2B5EF4-FFF2-40B4-BE49-F238E27FC236}">
-                  <a16:creationId xmlns:a16="http://schemas.microsoft.com/office/drawing/2014/main" id="{32F77B62-2A08-D89F-13E1-7936756E4CD0}"/>
-                </a:ext>
-              </a:extLst>
-            </p:cNvPr>
-            <p:cNvSpPr txBox="1"/>
-            <p:nvPr/>
-          </p:nvSpPr>
-          <p:spPr>
-            <a:xfrm>
-              <a:off x="0" y="-57150"/>
-              <a:ext cx="4816593" cy="951219"/>
-            </a:xfrm>
-            <a:prstGeom prst="rect">
-              <a:avLst/>
-            </a:prstGeom>
-          </p:spPr>
-          <p:txBody>
-            <a:bodyPr lIns="33867" tIns="33867" rIns="33867" bIns="33867" rtlCol="0" anchor="ctr"/>
-            <a:lstStyle/>
-            <a:p>
-              <a:pPr algn="ctr">
-                <a:lnSpc>
-                  <a:spcPts val="1847"/>
-                </a:lnSpc>
-              </a:pPr>
-              <a:endParaRPr sz="1200"/>
-            </a:p>
-          </p:txBody>
-        </p:sp>
-      </p:grpSp>
-      <p:sp>
-        <p:nvSpPr>
-          <p:cNvPr id="9" name="TextBox 9">
-            <a:extLst>
-              <a:ext uri="{FF2B5EF4-FFF2-40B4-BE49-F238E27FC236}">
-                <a16:creationId xmlns:a16="http://schemas.microsoft.com/office/drawing/2014/main" id="{35BD3F03-E513-F9A1-F2E4-2015ECC084E5}"/>
-              </a:ext>
-            </a:extLst>
-          </p:cNvPr>
-          <p:cNvSpPr txBox="1"/>
-          <p:nvPr/>
-        </p:nvSpPr>
-        <p:spPr>
-          <a:xfrm>
-            <a:off x="685800" y="330200"/>
-            <a:ext cx="10998199" cy="474489"/>
-          </a:xfrm>
-          <a:prstGeom prst="rect">
-            <a:avLst/>
-          </a:prstGeom>
-        </p:spPr>
-        <p:txBody>
-          <a:bodyPr wrap="square" lIns="0" tIns="0" rIns="0" bIns="0" rtlCol="0" anchor="t">
-            <a:spAutoFit/>
-          </a:bodyPr>
-          <a:lstStyle/>
-          <a:p>
-            <a:pPr>
-              <a:lnSpc>
-                <a:spcPts val="3744"/>
-              </a:lnSpc>
-            </a:pPr>
-            <a:r>
-              <a:rPr lang="en-US" sz="3466" b="1" dirty="0">
-                <a:solidFill>
-                  <a:srgbClr val="FFFFFF"/>
-                </a:solidFill>
-                <a:latin typeface="Poppins Semi-Bold"/>
-                <a:ea typeface="Poppins Semi-Bold"/>
-                <a:cs typeface="Poppins Semi-Bold"/>
-                <a:sym typeface="Poppins Semi-Bold"/>
-              </a:rPr>
-              <a:t>Special Query</a:t>
-            </a:r>
-            <a:endParaRPr lang="en-US" sz="3466" b="1" i="1" dirty="0">
-              <a:solidFill>
-                <a:srgbClr val="FFFFFF"/>
-              </a:solidFill>
-              <a:latin typeface="Poppins Semi-Bold"/>
-              <a:ea typeface="Poppins Semi-Bold"/>
-              <a:cs typeface="Poppins Semi-Bold"/>
-              <a:sym typeface="Poppins Semi-Bold"/>
-            </a:endParaRPr>
-          </a:p>
-        </p:txBody>
-      </p:sp>
-    </p:spTree>
-    <p:extLst>
-      <p:ext uri="{BB962C8B-B14F-4D97-AF65-F5344CB8AC3E}">
-        <p14:creationId xmlns:p14="http://schemas.microsoft.com/office/powerpoint/2010/main" val="526632772"/>
       </p:ext>
     </p:extLst>
   </p:cSld>

</xml_diff>